<commit_message>
extra cleaning in notebooks, added some slides in the powerpoint.
</commit_message>
<xml_diff>
--- a/Flight_delay.pptx
+++ b/Flight_delay.pptx
@@ -5,10 +5,10 @@
     <p:sldMasterId id="2147483648" r:id="rId1"/>
   </p:sldMasterIdLst>
   <p:notesMasterIdLst>
-    <p:notesMasterId r:id="rId14"/>
+    <p:notesMasterId r:id="rId16"/>
   </p:notesMasterIdLst>
   <p:handoutMasterIdLst>
-    <p:handoutMasterId r:id="rId15"/>
+    <p:handoutMasterId r:id="rId17"/>
   </p:handoutMasterIdLst>
   <p:sldIdLst>
     <p:sldId id="265" r:id="rId2"/>
@@ -23,6 +23,8 @@
     <p:sldId id="280" r:id="rId11"/>
     <p:sldId id="269" r:id="rId12"/>
     <p:sldId id="264" r:id="rId13"/>
+    <p:sldId id="283" r:id="rId14"/>
+    <p:sldId id="284" r:id="rId15"/>
   </p:sldIdLst>
   <p:sldSz cx="12192000" cy="6858000"/>
   <p:notesSz cx="6858000" cy="9144000"/>
@@ -3192,7 +3194,7 @@
           <a:p>
             <a:fld id="{20EA5F0D-C1DC-412F-A146-DDB3A74B588F}" type="datetimeFigureOut">
               <a:rPr lang="en-US"/>
-              <a:t>2/22/23</a:t>
+              <a:t>2/23/2023</a:t>
             </a:fld>
             <a:endParaRPr/>
           </a:p>
@@ -3357,7 +3359,7 @@
           <a:p>
             <a:fld id="{A8CDE508-72C8-4AB5-AA9C-1584D31690E0}" type="datetimeFigureOut">
               <a:rPr lang="en-US"/>
-              <a:t>2/22/23</a:t>
+              <a:t>2/23/2023</a:t>
             </a:fld>
             <a:endParaRPr/>
           </a:p>
@@ -4257,7 +4259,7 @@
             <a:fld id="{9E583DDF-CA54-461A-A486-592D2374C532}" type="datetimeFigureOut">
               <a:rPr lang="en-US"/>
               <a:pPr/>
-              <a:t>2/22/23</a:t>
+              <a:t>2/23/2023</a:t>
             </a:fld>
             <a:endParaRPr/>
           </a:p>
@@ -4633,7 +4635,7 @@
           <a:p>
             <a:fld id="{9E583DDF-CA54-461A-A486-592D2374C532}" type="datetimeFigureOut">
               <a:rPr lang="en-US"/>
-              <a:t>2/22/23</a:t>
+              <a:t>2/23/2023</a:t>
             </a:fld>
             <a:endParaRPr/>
           </a:p>
@@ -4815,7 +4817,7 @@
           <a:p>
             <a:fld id="{9E583DDF-CA54-461A-A486-592D2374C532}" type="datetimeFigureOut">
               <a:rPr lang="en-US"/>
-              <a:t>2/22/23</a:t>
+              <a:t>2/23/2023</a:t>
             </a:fld>
             <a:endParaRPr/>
           </a:p>
@@ -5007,7 +5009,7 @@
           <a:p>
             <a:fld id="{9E583DDF-CA54-461A-A486-592D2374C532}" type="datetimeFigureOut">
               <a:rPr lang="en-US"/>
-              <a:t>2/22/23</a:t>
+              <a:t>2/23/2023</a:t>
             </a:fld>
             <a:endParaRPr/>
           </a:p>
@@ -5193,7 +5195,7 @@
           <a:p>
             <a:fld id="{9E583DDF-CA54-461A-A486-592D2374C532}" type="datetimeFigureOut">
               <a:rPr lang="en-US"/>
-              <a:t>2/22/23</a:t>
+              <a:t>2/23/2023</a:t>
             </a:fld>
             <a:endParaRPr/>
           </a:p>
@@ -5577,7 +5579,7 @@
           <a:p>
             <a:fld id="{9E583DDF-CA54-461A-A486-592D2374C532}" type="datetimeFigureOut">
               <a:rPr lang="en-US"/>
-              <a:t>2/22/23</a:t>
+              <a:t>2/23/2023</a:t>
             </a:fld>
             <a:endParaRPr/>
           </a:p>
@@ -5866,7 +5868,7 @@
             <a:fld id="{9E583DDF-CA54-461A-A486-592D2374C532}" type="datetimeFigureOut">
               <a:rPr lang="en-US"/>
               <a:pPr/>
-              <a:t>2/22/23</a:t>
+              <a:t>2/23/2023</a:t>
             </a:fld>
             <a:endParaRPr/>
           </a:p>
@@ -6179,7 +6181,7 @@
           <a:p>
             <a:fld id="{9DD7D43D-6574-4C7B-808D-C6C12215A4D4}" type="datetimeFigureOut">
               <a:rPr lang="en-US"/>
-              <a:t>2/22/23</a:t>
+              <a:t>2/23/2023</a:t>
             </a:fld>
             <a:endParaRPr/>
           </a:p>
@@ -6623,7 +6625,7 @@
           <a:p>
             <a:fld id="{9E583DDF-CA54-461A-A486-592D2374C532}" type="datetimeFigureOut">
               <a:rPr lang="en-US"/>
-              <a:t>2/22/23</a:t>
+              <a:t>2/23/2023</a:t>
             </a:fld>
             <a:endParaRPr/>
           </a:p>
@@ -6753,7 +6755,7 @@
           <a:p>
             <a:fld id="{9E583DDF-CA54-461A-A486-592D2374C532}" type="datetimeFigureOut">
               <a:rPr lang="en-US"/>
-              <a:t>2/22/23</a:t>
+              <a:t>2/23/2023</a:t>
             </a:fld>
             <a:endParaRPr/>
           </a:p>
@@ -6877,7 +6879,7 @@
             <a:fld id="{9E583DDF-CA54-461A-A486-592D2374C532}" type="datetimeFigureOut">
               <a:rPr lang="en-US"/>
               <a:pPr/>
-              <a:t>2/22/23</a:t>
+              <a:t>2/23/2023</a:t>
             </a:fld>
             <a:endParaRPr/>
           </a:p>
@@ -7184,7 +7186,7 @@
           <a:p>
             <a:fld id="{9E583DDF-CA54-461A-A486-592D2374C532}" type="datetimeFigureOut">
               <a:rPr lang="en-US"/>
-              <a:t>2/22/23</a:t>
+              <a:t>2/23/2023</a:t>
             </a:fld>
             <a:endParaRPr/>
           </a:p>
@@ -7540,7 +7542,7 @@
             <a:fld id="{9E583DDF-CA54-461A-A486-592D2374C532}" type="datetimeFigureOut">
               <a:rPr lang="en-US" smtClean="0"/>
               <a:pPr/>
-              <a:t>2/22/23</a:t>
+              <a:t>2/23/2023</a:t>
             </a:fld>
             <a:endParaRPr lang="en-US"/>
           </a:p>
@@ -8396,22 +8398,10 @@
           <a:p>
             <a:r>
               <a:rPr lang="en-US" dirty="0"/>
-              <a:t>Add a Slide Title - 7</a:t>
-            </a:r>
-          </a:p>
-        </p:txBody>
-      </p:sp>
-      <p:sp>
-        <p:nvSpPr>
-          <p:cNvPr id="6" name="Picture Placeholder 3" descr="An empty placeholder to add an image. Click on the placeholder and select the image that you wish to add"/>
-          <p:cNvSpPr>
-            <a:spLocks noGrp="1"/>
-          </p:cNvSpPr>
-          <p:nvPr>
-            <p:ph type="pic" idx="1"/>
-          </p:nvPr>
-        </p:nvSpPr>
-        <p:spPr/>
+              <a:t>Random Forest Model</a:t>
+            </a:r>
+          </a:p>
+        </p:txBody>
       </p:sp>
       <p:sp>
         <p:nvSpPr>
@@ -8425,17 +8415,428 @@
         </p:nvSpPr>
         <p:spPr/>
         <p:txBody>
-          <a:bodyPr/>
+          <a:bodyPr>
+            <a:normAutofit fontScale="85000" lnSpcReduction="20000"/>
+          </a:bodyPr>
           <a:lstStyle/>
           <a:p>
-            <a:endParaRPr lang="en-US"/>
-          </a:p>
-        </p:txBody>
-      </p:sp>
+            <a:r>
+              <a:rPr lang="en-US" dirty="0"/>
+              <a:t>Parameters: </a:t>
+            </a:r>
+            <a:r>
+              <a:rPr lang="en-US" dirty="0" err="1"/>
+              <a:t>crs_elapsed_time</a:t>
+            </a:r>
+            <a:r>
+              <a:rPr lang="en-US" dirty="0"/>
+              <a:t>, distance, month, departing hour, arrival hour, origin, destination and </a:t>
+            </a:r>
+            <a:r>
+              <a:rPr lang="en-US" dirty="0" err="1"/>
+              <a:t>op_unique_carrier</a:t>
+            </a:r>
+            <a:r>
+              <a:rPr lang="en-US" dirty="0"/>
+              <a:t> </a:t>
+            </a:r>
+          </a:p>
+          <a:p>
+            <a:r>
+              <a:rPr lang="en-US" dirty="0"/>
+              <a:t>R2 Score: 0.005</a:t>
+            </a:r>
+          </a:p>
+          <a:p>
+            <a:r>
+              <a:rPr lang="en-US" dirty="0"/>
+              <a:t>Mean Squared Error: 2478.71</a:t>
+            </a:r>
+          </a:p>
+          <a:p>
+            <a:r>
+              <a:rPr lang="en-US" dirty="0"/>
+              <a:t>Root Mean Squared Error: 49.79</a:t>
+            </a:r>
+          </a:p>
+          <a:p>
+            <a:endParaRPr lang="en-US" dirty="0"/>
+          </a:p>
+        </p:txBody>
+      </p:sp>
+      <p:pic>
+        <p:nvPicPr>
+          <p:cNvPr id="12" name="Picture 11">
+            <a:extLst>
+              <a:ext uri="{FF2B5EF4-FFF2-40B4-BE49-F238E27FC236}">
+                <a16:creationId xmlns:a16="http://schemas.microsoft.com/office/drawing/2014/main" id="{43CF7645-F2A6-CB8F-1828-39E254C992D5}"/>
+              </a:ext>
+            </a:extLst>
+          </p:cNvPr>
+          <p:cNvPicPr>
+            <a:picLocks noChangeAspect="1"/>
+          </p:cNvPicPr>
+          <p:nvPr/>
+        </p:nvPicPr>
+        <p:blipFill>
+          <a:blip r:embed="rId2"/>
+          <a:stretch>
+            <a:fillRect/>
+          </a:stretch>
+        </p:blipFill>
+        <p:spPr>
+          <a:xfrm>
+            <a:off x="1" y="1535421"/>
+            <a:ext cx="7315200" cy="3787157"/>
+          </a:xfrm>
+          <a:prstGeom prst="rect">
+            <a:avLst/>
+          </a:prstGeom>
+        </p:spPr>
+      </p:pic>
     </p:spTree>
     <p:extLst>
       <p:ext uri="{BB962C8B-B14F-4D97-AF65-F5344CB8AC3E}">
         <p14:creationId xmlns:p14="http://schemas.microsoft.com/office/powerpoint/2010/main" val="158548089"/>
+      </p:ext>
+    </p:extLst>
+  </p:cSld>
+  <p:clrMapOvr>
+    <a:masterClrMapping/>
+  </p:clrMapOvr>
+  <mc:AlternateContent xmlns:mc="http://schemas.openxmlformats.org/markup-compatibility/2006" xmlns:p14="http://schemas.microsoft.com/office/powerpoint/2010/main">
+    <mc:Choice Requires="p14">
+      <p:transition spd="med" p14:dur="700">
+        <p:fade/>
+      </p:transition>
+    </mc:Choice>
+    <mc:Fallback xmlns="">
+      <p:transition spd="med">
+        <p:fade/>
+      </p:transition>
+    </mc:Fallback>
+  </mc:AlternateContent>
+</p:sld>
+</file>
+
+<file path=ppt/slides/slide13.xml><?xml version="1.0" encoding="utf-8"?>
+<p:sld xmlns:a="http://schemas.openxmlformats.org/drawingml/2006/main" xmlns:r="http://schemas.openxmlformats.org/officeDocument/2006/relationships" xmlns:p="http://schemas.openxmlformats.org/presentationml/2006/main">
+  <p:cSld>
+    <p:spTree>
+      <p:nvGrpSpPr>
+        <p:cNvPr id="1" name=""/>
+        <p:cNvGrpSpPr/>
+        <p:nvPr/>
+      </p:nvGrpSpPr>
+      <p:grpSpPr>
+        <a:xfrm>
+          <a:off x="0" y="0"/>
+          <a:ext cx="0" cy="0"/>
+          <a:chOff x="0" y="0"/>
+          <a:chExt cx="0" cy="0"/>
+        </a:xfrm>
+      </p:grpSpPr>
+      <p:sp>
+        <p:nvSpPr>
+          <p:cNvPr id="2" name="Title 1"/>
+          <p:cNvSpPr>
+            <a:spLocks noGrp="1"/>
+          </p:cNvSpPr>
+          <p:nvPr>
+            <p:ph type="title"/>
+          </p:nvPr>
+        </p:nvSpPr>
+        <p:spPr/>
+        <p:txBody>
+          <a:bodyPr/>
+          <a:lstStyle/>
+          <a:p>
+            <a:r>
+              <a:rPr lang="en-US" dirty="0" err="1"/>
+              <a:t>XGBoost</a:t>
+            </a:r>
+            <a:r>
+              <a:rPr lang="en-US" dirty="0"/>
+              <a:t> Model</a:t>
+            </a:r>
+          </a:p>
+        </p:txBody>
+      </p:sp>
+      <p:sp>
+        <p:nvSpPr>
+          <p:cNvPr id="4" name="Text Placeholder 2"/>
+          <p:cNvSpPr>
+            <a:spLocks noGrp="1"/>
+          </p:cNvSpPr>
+          <p:nvPr>
+            <p:ph type="body" sz="half" idx="2"/>
+          </p:nvPr>
+        </p:nvSpPr>
+        <p:spPr/>
+        <p:txBody>
+          <a:bodyPr>
+            <a:normAutofit fontScale="85000" lnSpcReduction="20000"/>
+          </a:bodyPr>
+          <a:lstStyle/>
+          <a:p>
+            <a:r>
+              <a:rPr lang="en-US" dirty="0"/>
+              <a:t>Parameters: </a:t>
+            </a:r>
+            <a:r>
+              <a:rPr lang="en-US" dirty="0" err="1"/>
+              <a:t>crs_elapsed_time</a:t>
+            </a:r>
+            <a:r>
+              <a:rPr lang="en-US" dirty="0"/>
+              <a:t>, distance, month, departing hour, arrival hour, origin, destination and </a:t>
+            </a:r>
+            <a:r>
+              <a:rPr lang="en-US" dirty="0" err="1"/>
+              <a:t>op_unique_carrier</a:t>
+            </a:r>
+            <a:r>
+              <a:rPr lang="en-US" dirty="0"/>
+              <a:t> </a:t>
+            </a:r>
+          </a:p>
+          <a:p>
+            <a:r>
+              <a:rPr lang="en-US" dirty="0"/>
+              <a:t>R2 Score: 0.013</a:t>
+            </a:r>
+          </a:p>
+          <a:p>
+            <a:r>
+              <a:rPr lang="en-US" dirty="0"/>
+              <a:t>Mean Squared Error: 2272.64</a:t>
+            </a:r>
+          </a:p>
+          <a:p>
+            <a:r>
+              <a:rPr lang="en-US" dirty="0"/>
+              <a:t>Root Mean Squared Error: 47.67</a:t>
+            </a:r>
+          </a:p>
+          <a:p>
+            <a:endParaRPr lang="en-US" dirty="0"/>
+          </a:p>
+        </p:txBody>
+      </p:sp>
+      <p:pic>
+        <p:nvPicPr>
+          <p:cNvPr id="7" name="Picture 6">
+            <a:extLst>
+              <a:ext uri="{FF2B5EF4-FFF2-40B4-BE49-F238E27FC236}">
+                <a16:creationId xmlns:a16="http://schemas.microsoft.com/office/drawing/2014/main" id="{F57F5A3B-A35A-C37F-2D8D-40C37DA26F03}"/>
+              </a:ext>
+            </a:extLst>
+          </p:cNvPr>
+          <p:cNvPicPr>
+            <a:picLocks noChangeAspect="1"/>
+          </p:cNvPicPr>
+          <p:nvPr/>
+        </p:nvPicPr>
+        <p:blipFill>
+          <a:blip r:embed="rId2"/>
+          <a:stretch>
+            <a:fillRect/>
+          </a:stretch>
+        </p:blipFill>
+        <p:spPr>
+          <a:xfrm>
+            <a:off x="11163" y="1530810"/>
+            <a:ext cx="7304037" cy="3796044"/>
+          </a:xfrm>
+          <a:prstGeom prst="rect">
+            <a:avLst/>
+          </a:prstGeom>
+        </p:spPr>
+      </p:pic>
+    </p:spTree>
+    <p:extLst>
+      <p:ext uri="{BB962C8B-B14F-4D97-AF65-F5344CB8AC3E}">
+        <p14:creationId xmlns:p14="http://schemas.microsoft.com/office/powerpoint/2010/main" val="2490218054"/>
+      </p:ext>
+    </p:extLst>
+  </p:cSld>
+  <p:clrMapOvr>
+    <a:masterClrMapping/>
+  </p:clrMapOvr>
+  <mc:AlternateContent xmlns:mc="http://schemas.openxmlformats.org/markup-compatibility/2006">
+    <mc:Choice xmlns:p14="http://schemas.microsoft.com/office/powerpoint/2010/main" Requires="p14">
+      <p:transition spd="med" p14:dur="700">
+        <p:fade/>
+      </p:transition>
+    </mc:Choice>
+    <mc:Fallback>
+      <p:transition spd="med">
+        <p:fade/>
+      </p:transition>
+    </mc:Fallback>
+  </mc:AlternateContent>
+</p:sld>
+</file>
+
+<file path=ppt/slides/slide14.xml><?xml version="1.0" encoding="utf-8"?>
+<p:sld xmlns:a="http://schemas.openxmlformats.org/drawingml/2006/main" xmlns:r="http://schemas.openxmlformats.org/officeDocument/2006/relationships" xmlns:p="http://schemas.openxmlformats.org/presentationml/2006/main">
+  <p:cSld>
+    <p:spTree>
+      <p:nvGrpSpPr>
+        <p:cNvPr id="1" name=""/>
+        <p:cNvGrpSpPr/>
+        <p:nvPr/>
+      </p:nvGrpSpPr>
+      <p:grpSpPr>
+        <a:xfrm>
+          <a:off x="0" y="0"/>
+          <a:ext cx="0" cy="0"/>
+          <a:chOff x="0" y="0"/>
+          <a:chExt cx="0" cy="0"/>
+        </a:xfrm>
+      </p:grpSpPr>
+      <p:sp>
+        <p:nvSpPr>
+          <p:cNvPr id="9" name="Title 1">
+            <a:extLst>
+              <a:ext uri="{FF2B5EF4-FFF2-40B4-BE49-F238E27FC236}">
+                <a16:creationId xmlns:a16="http://schemas.microsoft.com/office/drawing/2014/main" id="{F8E8EFC3-A54B-F432-0BE8-6AC5C940FA33}"/>
+              </a:ext>
+            </a:extLst>
+          </p:cNvPr>
+          <p:cNvSpPr>
+            <a:spLocks noGrp="1"/>
+          </p:cNvSpPr>
+          <p:nvPr>
+            <p:ph type="title"/>
+          </p:nvPr>
+        </p:nvSpPr>
+        <p:spPr>
+          <a:xfrm>
+            <a:off x="1341120" y="467360"/>
+            <a:ext cx="9509760" cy="1233424"/>
+          </a:xfrm>
+        </p:spPr>
+        <p:txBody>
+          <a:bodyPr/>
+          <a:lstStyle/>
+          <a:p>
+            <a:r>
+              <a:rPr lang="en-US" dirty="0"/>
+              <a:t>Challenges/Future Goals</a:t>
+            </a:r>
+          </a:p>
+        </p:txBody>
+      </p:sp>
+      <p:sp>
+        <p:nvSpPr>
+          <p:cNvPr id="11" name="Content Placeholder 2">
+            <a:extLst>
+              <a:ext uri="{FF2B5EF4-FFF2-40B4-BE49-F238E27FC236}">
+                <a16:creationId xmlns:a16="http://schemas.microsoft.com/office/drawing/2014/main" id="{07BA0D92-0CAA-5619-182A-01A6A3D87983}"/>
+              </a:ext>
+            </a:extLst>
+          </p:cNvPr>
+          <p:cNvSpPr>
+            <a:spLocks noGrp="1"/>
+          </p:cNvSpPr>
+          <p:nvPr>
+            <p:ph idx="1"/>
+          </p:nvPr>
+        </p:nvSpPr>
+        <p:spPr>
+          <a:xfrm>
+            <a:off x="1341120" y="1901952"/>
+            <a:ext cx="9509760" cy="4127627"/>
+          </a:xfrm>
+        </p:spPr>
+        <p:txBody>
+          <a:bodyPr>
+            <a:normAutofit fontScale="92500" lnSpcReduction="10000"/>
+          </a:bodyPr>
+          <a:lstStyle/>
+          <a:p>
+            <a:r>
+              <a:rPr lang="en-US" dirty="0"/>
+              <a:t>Understanding the hyperparameters of different machine learning models and optimizing them</a:t>
+            </a:r>
+          </a:p>
+          <a:p>
+            <a:r>
+              <a:rPr lang="en-US" dirty="0"/>
+              <a:t>Forging new features that are important and increases model accuracy</a:t>
+            </a:r>
+          </a:p>
+          <a:p>
+            <a:r>
+              <a:rPr lang="en-US" dirty="0"/>
+              <a:t>Weather and location API limited our use of weather information </a:t>
+            </a:r>
+          </a:p>
+          <a:p>
+            <a:pPr lvl="1"/>
+            <a:r>
+              <a:rPr lang="en-US" dirty="0"/>
+              <a:t>Only had a table of 500 weather forecasts</a:t>
+            </a:r>
+          </a:p>
+          <a:p>
+            <a:pPr marL="45720" indent="0">
+              <a:buNone/>
+            </a:pPr>
+            <a:endParaRPr lang="en-US" dirty="0"/>
+          </a:p>
+          <a:p>
+            <a:r>
+              <a:rPr lang="en-US" dirty="0"/>
+              <a:t>Attempt to complete the classification problem involving cancelled flights </a:t>
+            </a:r>
+          </a:p>
+          <a:p>
+            <a:r>
+              <a:rPr lang="en-US" dirty="0"/>
+              <a:t>Brainstorm more ideas for better features in return for a better model</a:t>
+            </a:r>
+          </a:p>
+          <a:p>
+            <a:r>
+              <a:rPr lang="en-US" dirty="0"/>
+              <a:t>Try out more regression models </a:t>
+            </a:r>
+          </a:p>
+          <a:p>
+            <a:pPr lvl="1"/>
+            <a:r>
+              <a:rPr lang="en-US" dirty="0"/>
+              <a:t>mainly focused on </a:t>
+            </a:r>
+            <a:r>
+              <a:rPr lang="en-US" dirty="0" err="1"/>
+              <a:t>XGBoost</a:t>
+            </a:r>
+            <a:r>
+              <a:rPr lang="en-US" dirty="0"/>
+              <a:t> and Random Forest</a:t>
+            </a:r>
+          </a:p>
+          <a:p>
+            <a:endParaRPr lang="en-US" dirty="0"/>
+          </a:p>
+          <a:p>
+            <a:endParaRPr lang="en-US" dirty="0"/>
+          </a:p>
+          <a:p>
+            <a:endParaRPr lang="en-US" dirty="0"/>
+          </a:p>
+          <a:p>
+            <a:endParaRPr lang="en-US" dirty="0"/>
+          </a:p>
+        </p:txBody>
+      </p:sp>
+    </p:spTree>
+    <p:extLst>
+      <p:ext uri="{BB962C8B-B14F-4D97-AF65-F5344CB8AC3E}">
+        <p14:creationId xmlns:p14="http://schemas.microsoft.com/office/powerpoint/2010/main" val="95733295"/>
       </p:ext>
     </p:extLst>
   </p:cSld>
@@ -8584,13 +8985,13 @@
   <p:clrMapOvr>
     <a:masterClrMapping/>
   </p:clrMapOvr>
-  <mc:AlternateContent xmlns:mc="http://schemas.openxmlformats.org/markup-compatibility/2006">
-    <mc:Choice xmlns:p14="http://schemas.microsoft.com/office/powerpoint/2010/main" Requires="p14">
+  <mc:AlternateContent xmlns:mc="http://schemas.openxmlformats.org/markup-compatibility/2006" xmlns:p14="http://schemas.microsoft.com/office/powerpoint/2010/main">
+    <mc:Choice Requires="p14">
       <p:transition spd="med" p14:dur="700">
         <p:fade/>
       </p:transition>
     </mc:Choice>
-    <mc:Fallback>
+    <mc:Fallback xmlns="">
       <p:transition spd="med">
         <p:fade/>
       </p:transition>
@@ -9355,12 +9756,45 @@
           </a:p>
         </p:txBody>
       </p:sp>
+      <p:sp>
+        <p:nvSpPr>
+          <p:cNvPr id="10" name="Text Placeholder 3">
+            <a:extLst>
+              <a:ext uri="{FF2B5EF4-FFF2-40B4-BE49-F238E27FC236}">
+                <a16:creationId xmlns:a16="http://schemas.microsoft.com/office/drawing/2014/main" id="{C8C9CCEE-AB4F-AB0F-124E-F24D57466675}"/>
+              </a:ext>
+            </a:extLst>
+          </p:cNvPr>
+          <p:cNvSpPr>
+            <a:spLocks noGrp="1"/>
+          </p:cNvSpPr>
+          <p:nvPr>
+            <p:ph type="body" sz="half" idx="2"/>
+          </p:nvPr>
+        </p:nvSpPr>
+        <p:spPr>
+          <a:xfrm>
+            <a:off x="7923214" y="4847961"/>
+            <a:ext cx="3200400" cy="1644614"/>
+          </a:xfrm>
+        </p:spPr>
+        <p:txBody>
+          <a:bodyPr/>
+          <a:lstStyle/>
+          <a:p>
+            <a:r>
+              <a:rPr lang="en-US" dirty="0"/>
+              <a:t>Does one cause the other?</a:t>
+            </a:r>
+          </a:p>
+        </p:txBody>
+      </p:sp>
       <p:pic>
         <p:nvPicPr>
-          <p:cNvPr id="3" name="Picture 2" descr="Chart&#10;&#10;Description automatically generated">
+          <p:cNvPr id="8" name="Picture 7" descr="Chart, histogram&#10;&#10;Description automatically generated">
             <a:extLst>
               <a:ext uri="{FF2B5EF4-FFF2-40B4-BE49-F238E27FC236}">
-                <a16:creationId xmlns:a16="http://schemas.microsoft.com/office/drawing/2014/main" id="{CEE73291-3B97-0FC7-A2D5-FA136F47F211}"/>
+                <a16:creationId xmlns:a16="http://schemas.microsoft.com/office/drawing/2014/main" id="{D53452B5-5CDD-4DF8-B5DE-1F4969F73D7B}"/>
               </a:ext>
             </a:extLst>
           </p:cNvPr>
@@ -9383,54 +9817,20 @@
         </p:blipFill>
         <p:spPr>
           <a:xfrm>
-            <a:off x="0" y="0"/>
-            <a:ext cx="7315200" cy="3429000"/>
+            <a:off x="0" y="3429000"/>
+            <a:ext cx="7315200" cy="3428999"/>
           </a:xfrm>
           <a:prstGeom prst="rect">
             <a:avLst/>
           </a:prstGeom>
-          <a:noFill/>
         </p:spPr>
       </p:pic>
-      <p:sp>
-        <p:nvSpPr>
-          <p:cNvPr id="10" name="Text Placeholder 3">
+      <p:pic>
+        <p:nvPicPr>
+          <p:cNvPr id="7" name="Picture 6">
             <a:extLst>
               <a:ext uri="{FF2B5EF4-FFF2-40B4-BE49-F238E27FC236}">
-                <a16:creationId xmlns:a16="http://schemas.microsoft.com/office/drawing/2014/main" id="{C8C9CCEE-AB4F-AB0F-124E-F24D57466675}"/>
-              </a:ext>
-            </a:extLst>
-          </p:cNvPr>
-          <p:cNvSpPr>
-            <a:spLocks noGrp="1"/>
-          </p:cNvSpPr>
-          <p:nvPr>
-            <p:ph type="body" sz="half" idx="2"/>
-          </p:nvPr>
-        </p:nvSpPr>
-        <p:spPr>
-          <a:xfrm>
-            <a:off x="7923214" y="4847961"/>
-            <a:ext cx="3200400" cy="1644614"/>
-          </a:xfrm>
-        </p:spPr>
-        <p:txBody>
-          <a:bodyPr/>
-          <a:lstStyle/>
-          <a:p>
-            <a:r>
-              <a:rPr lang="en-US" dirty="0"/>
-              <a:t>Does one cause the other?</a:t>
-            </a:r>
-          </a:p>
-        </p:txBody>
-      </p:sp>
-      <p:pic>
-        <p:nvPicPr>
-          <p:cNvPr id="8" name="Picture 7" descr="Chart, histogram&#10;&#10;Description automatically generated">
-            <a:extLst>
-              <a:ext uri="{FF2B5EF4-FFF2-40B4-BE49-F238E27FC236}">
-                <a16:creationId xmlns:a16="http://schemas.microsoft.com/office/drawing/2014/main" id="{D53452B5-5CDD-4DF8-B5DE-1F4969F73D7B}"/>
+                <a16:creationId xmlns:a16="http://schemas.microsoft.com/office/drawing/2014/main" id="{2D5EA5C9-A1DF-15B3-C257-C157202CFD41}"/>
               </a:ext>
             </a:extLst>
           </p:cNvPr>
@@ -9440,20 +9840,14 @@
           <p:nvPr/>
         </p:nvPicPr>
         <p:blipFill>
-          <a:blip r:embed="rId3">
-            <a:extLst>
-              <a:ext uri="{28A0092B-C50C-407E-A947-70E740481C1C}">
-                <a14:useLocalDpi xmlns:a14="http://schemas.microsoft.com/office/drawing/2010/main" val="0"/>
-              </a:ext>
-            </a:extLst>
-          </a:blip>
+          <a:blip r:embed="rId3"/>
           <a:stretch>
             <a:fillRect/>
           </a:stretch>
         </p:blipFill>
         <p:spPr>
           <a:xfrm>
-            <a:off x="0" y="3429000"/>
+            <a:off x="0" y="0"/>
             <a:ext cx="7315200" cy="3428999"/>
           </a:xfrm>
           <a:prstGeom prst="rect">
@@ -9819,7 +10213,7 @@
           </p:nvPr>
         </p:nvPicPr>
         <p:blipFill>
-          <a:blip r:embed="rId2">
+          <a:blip r:embed="rId2" cstate="print">
             <a:extLst>
               <a:ext uri="{28A0092B-C50C-407E-A947-70E740481C1C}">
                 <a14:useLocalDpi xmlns:a14="http://schemas.microsoft.com/office/drawing/2010/main" val="0"/>

</xml_diff>